<commit_message>
Update P1. (Full-Measurement States) System Identification and Control Synthesis.pptx
</commit_message>
<xml_diff>
--- a/requirements/P1. (Full-Measurement States) System Identification and Control Synthesis.pptx
+++ b/requirements/P1. (Full-Measurement States) System Identification and Control Synthesis.pptx
@@ -19,14 +19,7 @@
     <p:sldId id="431" r:id="rId13"/>
     <p:sldId id="433" r:id="rId14"/>
     <p:sldId id="435" r:id="rId15"/>
-    <p:sldId id="439" r:id="rId16"/>
-    <p:sldId id="261" r:id="rId17"/>
-    <p:sldId id="270" r:id="rId18"/>
-    <p:sldId id="437" r:id="rId19"/>
-    <p:sldId id="271" r:id="rId20"/>
-    <p:sldId id="262" r:id="rId21"/>
-    <p:sldId id="263" r:id="rId22"/>
-    <p:sldId id="267" r:id="rId23"/>
+    <p:sldId id="267" r:id="rId16"/>
   </p:sldIdLst>
   <p:sldSz cx="12192000" cy="6858000"/>
   <p:notesSz cx="6858000" cy="9144000"/>
@@ -2036,7 +2029,7 @@
           <a:p>
             <a:fld id="{26ECF0E8-3D60-4410-B974-50FF6275855E}" type="datetimeFigureOut">
               <a:rPr lang="en-US" smtClean="0"/>
-              <a:t>4/30/2021</a:t>
+              <a:t>6/2/2021</a:t>
             </a:fld>
             <a:endParaRPr lang="en-US"/>
           </a:p>
@@ -2325,7 +2318,7 @@
           <a:p>
             <a:fld id="{26ECF0E8-3D60-4410-B974-50FF6275855E}" type="datetimeFigureOut">
               <a:rPr lang="en-US" smtClean="0"/>
-              <a:t>4/30/2021</a:t>
+              <a:t>6/2/2021</a:t>
             </a:fld>
             <a:endParaRPr lang="en-US"/>
           </a:p>
@@ -2614,7 +2607,7 @@
           <a:p>
             <a:fld id="{26ECF0E8-3D60-4410-B974-50FF6275855E}" type="datetimeFigureOut">
               <a:rPr lang="en-US" smtClean="0"/>
-              <a:t>4/30/2021</a:t>
+              <a:t>6/2/2021</a:t>
             </a:fld>
             <a:endParaRPr lang="en-US"/>
           </a:p>
@@ -2903,7 +2896,7 @@
           <a:p>
             <a:fld id="{26ECF0E8-3D60-4410-B974-50FF6275855E}" type="datetimeFigureOut">
               <a:rPr lang="en-US" smtClean="0"/>
-              <a:t>4/30/2021</a:t>
+              <a:t>6/2/2021</a:t>
             </a:fld>
             <a:endParaRPr lang="en-US"/>
           </a:p>
@@ -3140,7 +3133,7 @@
           <a:p>
             <a:fld id="{26ECF0E8-3D60-4410-B974-50FF6275855E}" type="datetimeFigureOut">
               <a:rPr lang="en-US" smtClean="0"/>
-              <a:t>4/30/2021</a:t>
+              <a:t>6/2/2021</a:t>
             </a:fld>
             <a:endParaRPr lang="en-US"/>
           </a:p>
@@ -3644,7 +3637,7 @@
           <a:p>
             <a:fld id="{26ECF0E8-3D60-4410-B974-50FF6275855E}" type="datetimeFigureOut">
               <a:rPr lang="en-US" smtClean="0"/>
-              <a:t>4/30/2021</a:t>
+              <a:t>6/2/2021</a:t>
             </a:fld>
             <a:endParaRPr lang="en-US"/>
           </a:p>
@@ -3830,7 +3823,7 @@
           <a:p>
             <a:fld id="{26ECF0E8-3D60-4410-B974-50FF6275855E}" type="datetimeFigureOut">
               <a:rPr lang="en-US" smtClean="0"/>
-              <a:t>4/30/2021</a:t>
+              <a:t>6/2/2021</a:t>
             </a:fld>
             <a:endParaRPr lang="en-US"/>
           </a:p>
@@ -5643,7 +5636,7 @@
           <a:p>
             <a:fld id="{26ECF0E8-3D60-4410-B974-50FF6275855E}" type="datetimeFigureOut">
               <a:rPr lang="en-US" smtClean="0"/>
-              <a:t>4/30/2021</a:t>
+              <a:t>6/2/2021</a:t>
             </a:fld>
             <a:endParaRPr lang="en-US"/>
           </a:p>
@@ -5847,7 +5840,7 @@
           <a:p>
             <a:fld id="{26ECF0E8-3D60-4410-B974-50FF6275855E}" type="datetimeFigureOut">
               <a:rPr lang="en-US" smtClean="0"/>
-              <a:t>4/30/2021</a:t>
+              <a:t>6/2/2021</a:t>
             </a:fld>
             <a:endParaRPr lang="en-US"/>
           </a:p>
@@ -6048,7 +6041,7 @@
           <a:p>
             <a:fld id="{26ECF0E8-3D60-4410-B974-50FF6275855E}" type="datetimeFigureOut">
               <a:rPr lang="en-US" smtClean="0"/>
-              <a:t>4/30/2021</a:t>
+              <a:t>6/2/2021</a:t>
             </a:fld>
             <a:endParaRPr lang="en-US"/>
           </a:p>
@@ -6310,7 +6303,7 @@
           <a:p>
             <a:fld id="{26ECF0E8-3D60-4410-B974-50FF6275855E}" type="datetimeFigureOut">
               <a:rPr lang="en-US" smtClean="0"/>
-              <a:t>4/30/2021</a:t>
+              <a:t>6/2/2021</a:t>
             </a:fld>
             <a:endParaRPr lang="en-US"/>
           </a:p>
@@ -6686,7 +6679,7 @@
           <a:p>
             <a:fld id="{26ECF0E8-3D60-4410-B974-50FF6275855E}" type="datetimeFigureOut">
               <a:rPr lang="en-US" smtClean="0"/>
-              <a:t>4/30/2021</a:t>
+              <a:t>6/2/2021</a:t>
             </a:fld>
             <a:endParaRPr lang="en-US"/>
           </a:p>
@@ -7053,7 +7046,7 @@
           <a:p>
             <a:fld id="{26ECF0E8-3D60-4410-B974-50FF6275855E}" type="datetimeFigureOut">
               <a:rPr lang="en-US" smtClean="0"/>
-              <a:t>4/30/2021</a:t>
+              <a:t>6/2/2021</a:t>
             </a:fld>
             <a:endParaRPr lang="en-US"/>
           </a:p>
@@ -17357,7 +17350,7 @@
           <p:cNvPr id="4" name="Title 3">
             <a:extLst>
               <a:ext uri="{FF2B5EF4-FFF2-40B4-BE49-F238E27FC236}">
-                <a16:creationId xmlns:a16="http://schemas.microsoft.com/office/drawing/2014/main" id="{5DC29B37-00F7-4E78-A07F-0464AE3608F7}"/>
+                <a16:creationId xmlns:a16="http://schemas.microsoft.com/office/drawing/2014/main" id="{1A849F6C-873A-4382-88A3-C443B0AD2834}"/>
               </a:ext>
             </a:extLst>
           </p:cNvPr>
@@ -17375,7 +17368,7 @@
           <a:p>
             <a:r>
               <a:rPr lang="en-US" dirty="0"/>
-              <a:t>Project Plan</a:t>
+              <a:t>End</a:t>
             </a:r>
           </a:p>
         </p:txBody>
@@ -17383,7 +17376,7 @@
     </p:spTree>
     <p:extLst>
       <p:ext uri="{BB962C8B-B14F-4D97-AF65-F5344CB8AC3E}">
-        <p14:creationId xmlns:p14="http://schemas.microsoft.com/office/powerpoint/2010/main" val="3814201628"/>
+        <p14:creationId xmlns:p14="http://schemas.microsoft.com/office/powerpoint/2010/main" val="2355286508"/>
       </p:ext>
     </p:extLst>
   </p:cSld>
@@ -17393,1110 +17386,6 @@
   <p:transition spd="slow">
     <p:wipe dir="d"/>
   </p:transition>
-</p:sld>
-</file>
-
-<file path=ppt/slides/slide16.xml><?xml version="1.0" encoding="utf-8"?>
-<p:sld xmlns:a="http://schemas.openxmlformats.org/drawingml/2006/main" xmlns:r="http://schemas.openxmlformats.org/officeDocument/2006/relationships" xmlns:p="http://schemas.openxmlformats.org/presentationml/2006/main">
-  <p:cSld>
-    <p:spTree>
-      <p:nvGrpSpPr>
-        <p:cNvPr id="1" name=""/>
-        <p:cNvGrpSpPr/>
-        <p:nvPr/>
-      </p:nvGrpSpPr>
-      <p:grpSpPr>
-        <a:xfrm>
-          <a:off x="0" y="0"/>
-          <a:ext cx="0" cy="0"/>
-          <a:chOff x="0" y="0"/>
-          <a:chExt cx="0" cy="0"/>
-        </a:xfrm>
-      </p:grpSpPr>
-      <p:sp>
-        <p:nvSpPr>
-          <p:cNvPr id="2" name="Title 1">
-            <a:extLst>
-              <a:ext uri="{FF2B5EF4-FFF2-40B4-BE49-F238E27FC236}">
-                <a16:creationId xmlns:a16="http://schemas.microsoft.com/office/drawing/2014/main" id="{DBCA02B8-38C5-42AE-952E-252E8DB438A4}"/>
-              </a:ext>
-            </a:extLst>
-          </p:cNvPr>
-          <p:cNvSpPr>
-            <a:spLocks noGrp="1"/>
-          </p:cNvSpPr>
-          <p:nvPr>
-            <p:ph type="title"/>
-          </p:nvPr>
-        </p:nvSpPr>
-        <p:spPr/>
-        <p:txBody>
-          <a:bodyPr/>
-          <a:lstStyle/>
-          <a:p>
-            <a:r>
-              <a:rPr lang="en-US" dirty="0"/>
-              <a:t>Goals</a:t>
-            </a:r>
-          </a:p>
-        </p:txBody>
-      </p:sp>
-      <mc:AlternateContent xmlns:mc="http://schemas.openxmlformats.org/markup-compatibility/2006" xmlns:a14="http://schemas.microsoft.com/office/drawing/2010/main">
-        <mc:Choice Requires="a14">
-          <p:sp>
-            <p:nvSpPr>
-              <p:cNvPr id="3" name="Content Placeholder 2">
-                <a:extLst>
-                  <a:ext uri="{FF2B5EF4-FFF2-40B4-BE49-F238E27FC236}">
-                    <a16:creationId xmlns:a16="http://schemas.microsoft.com/office/drawing/2014/main" id="{EA9B348A-74A3-451B-A9FF-80211DE7E42B}"/>
-                  </a:ext>
-                </a:extLst>
-              </p:cNvPr>
-              <p:cNvSpPr>
-                <a:spLocks noGrp="1"/>
-              </p:cNvSpPr>
-              <p:nvPr>
-                <p:ph idx="1"/>
-              </p:nvPr>
-            </p:nvSpPr>
-            <p:spPr>
-              <a:xfrm>
-                <a:off x="478368" y="1520769"/>
-                <a:ext cx="9399923" cy="5060883"/>
-              </a:xfrm>
-            </p:spPr>
-            <p:txBody>
-              <a:bodyPr/>
-              <a:lstStyle/>
-              <a:p>
-                <a:pPr marL="342900" indent="-342900">
-                  <a:lnSpc>
-                    <a:spcPct val="200000"/>
-                  </a:lnSpc>
-                  <a:buFont typeface="Arial" panose="020B0604020202020204" pitchFamily="34" charset="0"/>
-                  <a:buChar char="•"/>
-                </a:pPr>
-                <a:r>
-                  <a:rPr lang="en-US" dirty="0"/>
-                  <a:t>Keep system operation at maximum utility, which is a system state </a:t>
-                </a:r>
-                <a14:m>
-                  <m:oMath xmlns:m="http://schemas.openxmlformats.org/officeDocument/2006/math">
-                    <m:sSub>
-                      <m:sSubPr>
-                        <m:ctrlPr>
-                          <a:rPr lang="en-US" i="1" dirty="0" smtClean="0">
-                            <a:latin typeface="Cambria Math" panose="02040503050406030204" pitchFamily="18" charset="0"/>
-                          </a:rPr>
-                        </m:ctrlPr>
-                      </m:sSubPr>
-                      <m:e>
-                        <m:r>
-                          <a:rPr lang="en-US" i="1" dirty="0" smtClean="0">
-                            <a:latin typeface="Cambria Math" panose="02040503050406030204" pitchFamily="18" charset="0"/>
-                          </a:rPr>
-                          <m:t>𝑥</m:t>
-                        </m:r>
-                      </m:e>
-                      <m:sub>
-                        <m:r>
-                          <a:rPr lang="en-US" i="1" dirty="0" smtClean="0">
-                            <a:latin typeface="Cambria Math" panose="02040503050406030204" pitchFamily="18" charset="0"/>
-                          </a:rPr>
-                          <m:t>𝑘</m:t>
-                        </m:r>
-                      </m:sub>
-                    </m:sSub>
-                  </m:oMath>
-                </a14:m>
-                <a:r>
-                  <a:rPr lang="en-US" dirty="0"/>
-                  <a:t> where all components at </a:t>
-                </a:r>
-                <a14:m>
-                  <m:oMath xmlns:m="http://schemas.openxmlformats.org/officeDocument/2006/math">
-                    <m:r>
-                      <a:rPr lang="en-US" i="1" dirty="0" smtClean="0">
-                        <a:latin typeface="Cambria Math" panose="02040503050406030204" pitchFamily="18" charset="0"/>
-                      </a:rPr>
-                      <m:t>𝐶</m:t>
-                    </m:r>
-                    <m:sSub>
-                      <m:sSubPr>
-                        <m:ctrlPr>
-                          <a:rPr lang="en-US" i="1" dirty="0" smtClean="0">
-                            <a:latin typeface="Cambria Math" panose="02040503050406030204" pitchFamily="18" charset="0"/>
-                          </a:rPr>
-                        </m:ctrlPr>
-                      </m:sSubPr>
-                      <m:e>
-                        <m:r>
-                          <a:rPr lang="en-US" i="1" dirty="0" smtClean="0">
-                            <a:latin typeface="Cambria Math" panose="02040503050406030204" pitchFamily="18" charset="0"/>
-                          </a:rPr>
-                          <m:t>𝐹</m:t>
-                        </m:r>
-                      </m:e>
-                      <m:sub>
-                        <m:r>
-                          <a:rPr lang="en-US" i="1" dirty="0" smtClean="0">
-                            <a:latin typeface="Cambria Math" panose="02040503050406030204" pitchFamily="18" charset="0"/>
-                          </a:rPr>
-                          <m:t>0</m:t>
-                        </m:r>
-                      </m:sub>
-                    </m:sSub>
-                  </m:oMath>
-                </a14:m>
-                <a:r>
-                  <a:rPr lang="en-US" dirty="0"/>
-                  <a:t> mode</a:t>
-                </a:r>
-              </a:p>
-              <a:p>
-                <a:pPr marL="342900" indent="-342900">
-                  <a:lnSpc>
-                    <a:spcPct val="200000"/>
-                  </a:lnSpc>
-                  <a:buFont typeface="Arial" panose="020B0604020202020204" pitchFamily="34" charset="0"/>
-                  <a:buChar char="•"/>
-                </a:pPr>
-                <a:endParaRPr lang="en-US" dirty="0"/>
-              </a:p>
-              <a:p>
-                <a:pPr marL="342900" indent="-342900">
-                  <a:lnSpc>
-                    <a:spcPct val="200000"/>
-                  </a:lnSpc>
-                  <a:buFont typeface="Arial" panose="020B0604020202020204" pitchFamily="34" charset="0"/>
-                  <a:buChar char="•"/>
-                </a:pPr>
-                <a:r>
-                  <a:rPr lang="en-US" dirty="0"/>
-                  <a:t>Counteract the disturbances as quickly as possible to minimize the cumulative drop in total utility = </a:t>
-                </a:r>
-                <a14:m>
-                  <m:oMath xmlns:m="http://schemas.openxmlformats.org/officeDocument/2006/math">
-                    <m:nary>
-                      <m:naryPr>
-                        <m:chr m:val="∑"/>
-                        <m:supHide m:val="on"/>
-                        <m:ctrlPr>
-                          <a:rPr lang="en-US" b="0" i="1" dirty="0" smtClean="0">
-                            <a:latin typeface="Cambria Math" panose="02040503050406030204" pitchFamily="18" charset="0"/>
-                          </a:rPr>
-                        </m:ctrlPr>
-                      </m:naryPr>
-                      <m:sub>
-                        <m:r>
-                          <a:rPr lang="en-US" b="0" i="1" dirty="0" smtClean="0">
-                            <a:latin typeface="Cambria Math" panose="02040503050406030204" pitchFamily="18" charset="0"/>
-                          </a:rPr>
-                          <m:t>1∈</m:t>
-                        </m:r>
-                        <m:r>
-                          <a:rPr lang="en-US" b="0" i="1" dirty="0" smtClean="0">
-                            <a:latin typeface="Cambria Math" panose="02040503050406030204" pitchFamily="18" charset="0"/>
-                          </a:rPr>
-                          <m:t>𝐾</m:t>
-                        </m:r>
-                      </m:sub>
-                      <m:sup/>
-                      <m:e>
-                        <m:nary>
-                          <m:naryPr>
-                            <m:chr m:val="∑"/>
-                            <m:supHide m:val="on"/>
-                            <m:ctrlPr>
-                              <a:rPr lang="en-US" i="1" dirty="0">
-                                <a:latin typeface="Cambria Math" panose="02040503050406030204" pitchFamily="18" charset="0"/>
-                              </a:rPr>
-                            </m:ctrlPr>
-                          </m:naryPr>
-                          <m:sub>
-                            <m:r>
-                              <a:rPr lang="en-US" i="1" dirty="0">
-                                <a:latin typeface="Cambria Math" panose="02040503050406030204" pitchFamily="18" charset="0"/>
-                              </a:rPr>
-                              <m:t>𝑖</m:t>
-                            </m:r>
-                            <m:r>
-                              <a:rPr lang="en-US" i="1" dirty="0">
-                                <a:latin typeface="Cambria Math" panose="02040503050406030204" pitchFamily="18" charset="0"/>
-                              </a:rPr>
-                              <m:t>∈{1,</m:t>
-                            </m:r>
-                            <m:r>
-                              <a:rPr lang="en-US" i="1" dirty="0">
-                                <a:latin typeface="Cambria Math" panose="02040503050406030204" pitchFamily="18" charset="0"/>
-                              </a:rPr>
-                              <m:t>𝑚</m:t>
-                            </m:r>
-                            <m:r>
-                              <a:rPr lang="en-US" i="1" dirty="0">
-                                <a:latin typeface="Cambria Math" panose="02040503050406030204" pitchFamily="18" charset="0"/>
-                              </a:rPr>
-                              <m:t>}</m:t>
-                            </m:r>
-                          </m:sub>
-                          <m:sup/>
-                          <m:e>
-                            <m:sSup>
-                              <m:sSupPr>
-                                <m:ctrlPr>
-                                  <a:rPr lang="en-US" i="1" dirty="0">
-                                    <a:latin typeface="Cambria Math" panose="02040503050406030204" pitchFamily="18" charset="0"/>
-                                  </a:rPr>
-                                </m:ctrlPr>
-                              </m:sSupPr>
-                              <m:e>
-                                <m:r>
-                                  <a:rPr lang="en-US" i="1" dirty="0">
-                                    <a:latin typeface="Cambria Math" panose="02040503050406030204" pitchFamily="18" charset="0"/>
-                                  </a:rPr>
-                                  <m:t>𝑦</m:t>
-                                </m:r>
-                              </m:e>
-                              <m:sup>
-                                <m:r>
-                                  <a:rPr lang="en-US" i="1" dirty="0">
-                                    <a:latin typeface="Cambria Math" panose="02040503050406030204" pitchFamily="18" charset="0"/>
-                                  </a:rPr>
-                                  <m:t>𝑚</m:t>
-                                </m:r>
-                              </m:sup>
-                            </m:sSup>
-                          </m:e>
-                        </m:nary>
-                      </m:e>
-                    </m:nary>
-                  </m:oMath>
-                </a14:m>
-                <a:r>
-                  <a:rPr lang="en-US" dirty="0"/>
-                  <a:t>, i.e., sum of all individual utilities in K steps</a:t>
-                </a:r>
-              </a:p>
-              <a:p>
-                <a:endParaRPr lang="en-US" dirty="0"/>
-              </a:p>
-            </p:txBody>
-          </p:sp>
-        </mc:Choice>
-        <mc:Fallback xmlns="">
-          <p:sp>
-            <p:nvSpPr>
-              <p:cNvPr id="3" name="Content Placeholder 2">
-                <a:extLst>
-                  <a:ext uri="{FF2B5EF4-FFF2-40B4-BE49-F238E27FC236}">
-                    <a16:creationId xmlns:a16="http://schemas.microsoft.com/office/drawing/2014/main" id="{EA9B348A-74A3-451B-A9FF-80211DE7E42B}"/>
-                  </a:ext>
-                </a:extLst>
-              </p:cNvPr>
-              <p:cNvSpPr>
-                <a:spLocks noGrp="1" noRot="1" noChangeAspect="1" noMove="1" noResize="1" noEditPoints="1" noAdjustHandles="1" noChangeArrowheads="1" noChangeShapeType="1" noTextEdit="1"/>
-              </p:cNvSpPr>
-              <p:nvPr>
-                <p:ph idx="1"/>
-              </p:nvPr>
-            </p:nvSpPr>
-            <p:spPr>
-              <a:xfrm>
-                <a:off x="478368" y="1520769"/>
-                <a:ext cx="9399923" cy="5060883"/>
-              </a:xfrm>
-              <a:blipFill>
-                <a:blip r:embed="rId2"/>
-                <a:stretch>
-                  <a:fillRect l="-1427"/>
-                </a:stretch>
-              </a:blipFill>
-            </p:spPr>
-            <p:txBody>
-              <a:bodyPr/>
-              <a:lstStyle/>
-              <a:p>
-                <a:r>
-                  <a:rPr lang="en-US">
-                    <a:noFill/>
-                  </a:rPr>
-                  <a:t> </a:t>
-                </a:r>
-              </a:p>
-            </p:txBody>
-          </p:sp>
-        </mc:Fallback>
-      </mc:AlternateContent>
-    </p:spTree>
-    <p:extLst>
-      <p:ext uri="{BB962C8B-B14F-4D97-AF65-F5344CB8AC3E}">
-        <p14:creationId xmlns:p14="http://schemas.microsoft.com/office/powerpoint/2010/main" val="1622083263"/>
-      </p:ext>
-    </p:extLst>
-  </p:cSld>
-  <p:clrMapOvr>
-    <a:masterClrMapping/>
-  </p:clrMapOvr>
-</p:sld>
-</file>
-
-<file path=ppt/slides/slide17.xml><?xml version="1.0" encoding="utf-8"?>
-<p:sld xmlns:a="http://schemas.openxmlformats.org/drawingml/2006/main" xmlns:r="http://schemas.openxmlformats.org/officeDocument/2006/relationships" xmlns:p="http://schemas.openxmlformats.org/presentationml/2006/main">
-  <p:cSld>
-    <p:spTree>
-      <p:nvGrpSpPr>
-        <p:cNvPr id="1" name=""/>
-        <p:cNvGrpSpPr/>
-        <p:nvPr/>
-      </p:nvGrpSpPr>
-      <p:grpSpPr>
-        <a:xfrm>
-          <a:off x="0" y="0"/>
-          <a:ext cx="0" cy="0"/>
-          <a:chOff x="0" y="0"/>
-          <a:chExt cx="0" cy="0"/>
-        </a:xfrm>
-      </p:grpSpPr>
-      <p:sp>
-        <p:nvSpPr>
-          <p:cNvPr id="2" name="Title 1">
-            <a:extLst>
-              <a:ext uri="{FF2B5EF4-FFF2-40B4-BE49-F238E27FC236}">
-                <a16:creationId xmlns:a16="http://schemas.microsoft.com/office/drawing/2014/main" id="{50BD97A1-9AB1-476F-A7C3-F662667D1DEE}"/>
-              </a:ext>
-            </a:extLst>
-          </p:cNvPr>
-          <p:cNvSpPr>
-            <a:spLocks noGrp="1"/>
-          </p:cNvSpPr>
-          <p:nvPr>
-            <p:ph type="title"/>
-          </p:nvPr>
-        </p:nvSpPr>
-        <p:spPr/>
-        <p:txBody>
-          <a:bodyPr/>
-          <a:lstStyle/>
-          <a:p>
-            <a:r>
-              <a:rPr lang="en-US" dirty="0"/>
-              <a:t>Inputs</a:t>
-            </a:r>
-          </a:p>
-        </p:txBody>
-      </p:sp>
-      <mc:AlternateContent xmlns:mc="http://schemas.openxmlformats.org/markup-compatibility/2006" xmlns:a14="http://schemas.microsoft.com/office/drawing/2010/main">
-        <mc:Choice Requires="a14">
-          <p:sp>
-            <p:nvSpPr>
-              <p:cNvPr id="3" name="Content Placeholder 2">
-                <a:extLst>
-                  <a:ext uri="{FF2B5EF4-FFF2-40B4-BE49-F238E27FC236}">
-                    <a16:creationId xmlns:a16="http://schemas.microsoft.com/office/drawing/2014/main" id="{A1E99C37-D85E-49D9-93FB-7DBBD732EBC1}"/>
-                  </a:ext>
-                </a:extLst>
-              </p:cNvPr>
-              <p:cNvSpPr>
-                <a:spLocks noGrp="1"/>
-              </p:cNvSpPr>
-              <p:nvPr>
-                <p:ph idx="1"/>
-              </p:nvPr>
-            </p:nvSpPr>
-            <p:spPr/>
-            <p:txBody>
-              <a:bodyPr/>
-              <a:lstStyle/>
-              <a:p>
-                <a:pPr marL="342900" indent="-342900">
-                  <a:lnSpc>
-                    <a:spcPct val="200000"/>
-                  </a:lnSpc>
-                  <a:buFont typeface="Arial" panose="020B0604020202020204" pitchFamily="34" charset="0"/>
-                  <a:buChar char="•"/>
-                </a:pPr>
-                <a:r>
-                  <a:rPr lang="en-US" b="1" dirty="0"/>
-                  <a:t>Batch file </a:t>
-                </a:r>
-                <a:r>
-                  <a:rPr lang="en-US" dirty="0"/>
-                  <a:t>with utility changes to pre-train the system dynamics and controller</a:t>
-                </a:r>
-              </a:p>
-              <a:p>
-                <a:pPr marL="342900" indent="-342900">
-                  <a:lnSpc>
-                    <a:spcPct val="200000"/>
-                  </a:lnSpc>
-                  <a:buFont typeface="Arial" panose="020B0604020202020204" pitchFamily="34" charset="0"/>
-                  <a:buChar char="•"/>
-                </a:pPr>
-                <a:r>
-                  <a:rPr lang="en-US" b="1" dirty="0"/>
-                  <a:t>Disturbance profiles </a:t>
-                </a:r>
-                <a:r>
-                  <a:rPr lang="en-US" dirty="0"/>
-                  <a:t>correspond to various numbers of failures affecting the individual states of components, e.g., transition from </a:t>
-                </a:r>
-                <a14:m>
-                  <m:oMath xmlns:m="http://schemas.openxmlformats.org/officeDocument/2006/math">
-                    <m:sSub>
-                      <m:sSubPr>
-                        <m:ctrlPr>
-                          <a:rPr lang="en-US" i="1" dirty="0" smtClean="0">
-                            <a:latin typeface="Cambria Math" panose="02040503050406030204" pitchFamily="18" charset="0"/>
-                          </a:rPr>
-                        </m:ctrlPr>
-                      </m:sSubPr>
-                      <m:e>
-                        <m:r>
-                          <a:rPr lang="en-US" b="0" i="1" dirty="0" smtClean="0">
-                            <a:latin typeface="Cambria Math" panose="02040503050406030204" pitchFamily="18" charset="0"/>
-                          </a:rPr>
-                          <m:t>𝐶</m:t>
-                        </m:r>
-                        <m:r>
-                          <a:rPr lang="en-US" i="1" dirty="0" smtClean="0">
-                            <a:latin typeface="Cambria Math" panose="02040503050406030204" pitchFamily="18" charset="0"/>
-                          </a:rPr>
-                          <m:t>𝐹</m:t>
-                        </m:r>
-                      </m:e>
-                      <m:sub>
-                        <m:r>
-                          <a:rPr lang="en-US" i="1" dirty="0" smtClean="0">
-                            <a:latin typeface="Cambria Math" panose="02040503050406030204" pitchFamily="18" charset="0"/>
-                          </a:rPr>
-                          <m:t>0</m:t>
-                        </m:r>
-                      </m:sub>
-                    </m:sSub>
-                    <m:r>
-                      <a:rPr lang="en-US" i="1" dirty="0" smtClean="0">
-                        <a:latin typeface="Cambria Math" panose="02040503050406030204" pitchFamily="18" charset="0"/>
-                      </a:rPr>
-                      <m:t>→ {</m:t>
-                    </m:r>
-                    <m:r>
-                      <a:rPr lang="en-US" b="0" i="1" dirty="0" smtClean="0">
-                        <a:latin typeface="Cambria Math" panose="02040503050406030204" pitchFamily="18" charset="0"/>
-                      </a:rPr>
-                      <m:t>𝐶</m:t>
-                    </m:r>
-                    <m:sSub>
-                      <m:sSubPr>
-                        <m:ctrlPr>
-                          <a:rPr lang="en-US" b="0" i="1" dirty="0" smtClean="0">
-                            <a:latin typeface="Cambria Math" panose="02040503050406030204" pitchFamily="18" charset="0"/>
-                          </a:rPr>
-                        </m:ctrlPr>
-                      </m:sSubPr>
-                      <m:e>
-                        <m:r>
-                          <a:rPr lang="en-US" i="1" dirty="0" smtClean="0">
-                            <a:latin typeface="Cambria Math" panose="02040503050406030204" pitchFamily="18" charset="0"/>
-                          </a:rPr>
-                          <m:t>𝐹</m:t>
-                        </m:r>
-                      </m:e>
-                      <m:sub>
-                        <m:r>
-                          <a:rPr lang="en-US" i="1" dirty="0" smtClean="0">
-                            <a:latin typeface="Cambria Math" panose="02040503050406030204" pitchFamily="18" charset="0"/>
-                          </a:rPr>
-                          <m:t>1</m:t>
-                        </m:r>
-                      </m:sub>
-                    </m:sSub>
-                    <m:r>
-                      <a:rPr lang="en-US" i="1" dirty="0" smtClean="0">
-                        <a:latin typeface="Cambria Math" panose="02040503050406030204" pitchFamily="18" charset="0"/>
-                      </a:rPr>
-                      <m:t>,.., </m:t>
-                    </m:r>
-                    <m:r>
-                      <a:rPr lang="en-US" b="0" i="1" dirty="0" smtClean="0">
-                        <a:latin typeface="Cambria Math" panose="02040503050406030204" pitchFamily="18" charset="0"/>
-                      </a:rPr>
-                      <m:t>𝐶</m:t>
-                    </m:r>
-                    <m:sSub>
-                      <m:sSubPr>
-                        <m:ctrlPr>
-                          <a:rPr lang="en-US" b="0" i="1" dirty="0" smtClean="0">
-                            <a:latin typeface="Cambria Math" panose="02040503050406030204" pitchFamily="18" charset="0"/>
-                          </a:rPr>
-                        </m:ctrlPr>
-                      </m:sSubPr>
-                      <m:e>
-                        <m:r>
-                          <a:rPr lang="en-US" i="1" dirty="0" smtClean="0">
-                            <a:latin typeface="Cambria Math" panose="02040503050406030204" pitchFamily="18" charset="0"/>
-                          </a:rPr>
-                          <m:t>𝐹</m:t>
-                        </m:r>
-                      </m:e>
-                      <m:sub>
-                        <m:r>
-                          <a:rPr lang="en-US" i="1" dirty="0" smtClean="0">
-                            <a:latin typeface="Cambria Math" panose="02040503050406030204" pitchFamily="18" charset="0"/>
-                          </a:rPr>
-                          <m:t>5</m:t>
-                        </m:r>
-                      </m:sub>
-                    </m:sSub>
-                    <m:r>
-                      <a:rPr lang="en-US" i="1" dirty="0" smtClean="0">
-                        <a:latin typeface="Cambria Math" panose="02040503050406030204" pitchFamily="18" charset="0"/>
-                      </a:rPr>
-                      <m:t>}</m:t>
-                    </m:r>
-                  </m:oMath>
-                </a14:m>
-                <a:endParaRPr lang="en-US" dirty="0"/>
-              </a:p>
-              <a:p>
-                <a:pPr marL="342900" indent="-342900">
-                  <a:lnSpc>
-                    <a:spcPct val="200000"/>
-                  </a:lnSpc>
-                  <a:buFont typeface="Arial" panose="020B0604020202020204" pitchFamily="34" charset="0"/>
-                  <a:buChar char="•"/>
-                </a:pPr>
-                <a:r>
-                  <a:rPr lang="en-US" b="1" dirty="0"/>
-                  <a:t>Full-state measurements</a:t>
-                </a:r>
-                <a:r>
-                  <a:rPr lang="en-US" dirty="0"/>
-                  <a:t> at any given step </a:t>
-                </a:r>
-                <a:r>
-                  <a:rPr lang="en-US" b="1" i="1" dirty="0"/>
-                  <a:t>k</a:t>
-                </a:r>
-                <a:r>
-                  <a:rPr lang="en-US" dirty="0"/>
-                  <a:t>, you will be able to obtain </a:t>
-                </a:r>
-                <a14:m>
-                  <m:oMath xmlns:m="http://schemas.openxmlformats.org/officeDocument/2006/math">
-                    <m:r>
-                      <a:rPr lang="en-US" i="1" dirty="0" smtClean="0">
-                        <a:latin typeface="Cambria Math" panose="02040503050406030204" pitchFamily="18" charset="0"/>
-                      </a:rPr>
-                      <m:t>{</m:t>
-                    </m:r>
-                    <m:sSubSup>
-                      <m:sSubSupPr>
-                        <m:ctrlPr>
-                          <a:rPr lang="en-US" b="0" i="1" dirty="0" smtClean="0">
-                            <a:latin typeface="Cambria Math" panose="02040503050406030204" pitchFamily="18" charset="0"/>
-                          </a:rPr>
-                        </m:ctrlPr>
-                      </m:sSubSupPr>
-                      <m:e>
-                        <m:r>
-                          <a:rPr lang="en-US" i="1" dirty="0" smtClean="0">
-                            <a:latin typeface="Cambria Math" panose="02040503050406030204" pitchFamily="18" charset="0"/>
-                          </a:rPr>
-                          <m:t>𝑥</m:t>
-                        </m:r>
-                      </m:e>
-                      <m:sub>
-                        <m:r>
-                          <a:rPr lang="en-US" i="1" dirty="0" smtClean="0">
-                            <a:latin typeface="Cambria Math" panose="02040503050406030204" pitchFamily="18" charset="0"/>
-                          </a:rPr>
-                          <m:t>𝑘</m:t>
-                        </m:r>
-                      </m:sub>
-                      <m:sup>
-                        <m:r>
-                          <a:rPr lang="en-US" b="0" i="1" dirty="0" smtClean="0">
-                            <a:latin typeface="Cambria Math" panose="02040503050406030204" pitchFamily="18" charset="0"/>
-                          </a:rPr>
-                          <m:t>𝑚</m:t>
-                        </m:r>
-                      </m:sup>
-                    </m:sSubSup>
-                    <m:r>
-                      <a:rPr lang="en-US" i="1" dirty="0" smtClean="0">
-                        <a:latin typeface="Cambria Math" panose="02040503050406030204" pitchFamily="18" charset="0"/>
-                      </a:rPr>
-                      <m:t>,</m:t>
-                    </m:r>
-                    <m:sSubSup>
-                      <m:sSubSupPr>
-                        <m:ctrlPr>
-                          <a:rPr lang="en-US" b="0" i="1" dirty="0" smtClean="0">
-                            <a:latin typeface="Cambria Math" panose="02040503050406030204" pitchFamily="18" charset="0"/>
-                          </a:rPr>
-                        </m:ctrlPr>
-                      </m:sSubSupPr>
-                      <m:e>
-                        <m:r>
-                          <a:rPr lang="en-US" i="1" dirty="0" smtClean="0">
-                            <a:latin typeface="Cambria Math" panose="02040503050406030204" pitchFamily="18" charset="0"/>
-                          </a:rPr>
-                          <m:t>𝑦</m:t>
-                        </m:r>
-                      </m:e>
-                      <m:sub>
-                        <m:r>
-                          <a:rPr lang="en-US" i="1" dirty="0" smtClean="0">
-                            <a:latin typeface="Cambria Math" panose="02040503050406030204" pitchFamily="18" charset="0"/>
-                          </a:rPr>
-                          <m:t>𝑘</m:t>
-                        </m:r>
-                      </m:sub>
-                      <m:sup>
-                        <m:r>
-                          <a:rPr lang="en-US" b="0" i="1" dirty="0" smtClean="0">
-                            <a:latin typeface="Cambria Math" panose="02040503050406030204" pitchFamily="18" charset="0"/>
-                          </a:rPr>
-                          <m:t>𝑚</m:t>
-                        </m:r>
-                      </m:sup>
-                    </m:sSubSup>
-                    <m:r>
-                      <a:rPr lang="en-US" i="1" dirty="0" smtClean="0">
-                        <a:latin typeface="Cambria Math" panose="02040503050406030204" pitchFamily="18" charset="0"/>
-                      </a:rPr>
-                      <m:t>, </m:t>
-                    </m:r>
-                    <m:sSubSup>
-                      <m:sSubSupPr>
-                        <m:ctrlPr>
-                          <a:rPr lang="en-US" b="0" i="1" dirty="0" smtClean="0">
-                            <a:latin typeface="Cambria Math" panose="02040503050406030204" pitchFamily="18" charset="0"/>
-                          </a:rPr>
-                        </m:ctrlPr>
-                      </m:sSubSupPr>
-                      <m:e>
-                        <m:r>
-                          <a:rPr lang="en-US" i="1" dirty="0" smtClean="0">
-                            <a:latin typeface="Cambria Math" panose="02040503050406030204" pitchFamily="18" charset="0"/>
-                          </a:rPr>
-                          <m:t>𝜃</m:t>
-                        </m:r>
-                      </m:e>
-                      <m:sub>
-                        <m:r>
-                          <a:rPr lang="en-US" i="1" dirty="0" smtClean="0">
-                            <a:latin typeface="Cambria Math" panose="02040503050406030204" pitchFamily="18" charset="0"/>
-                          </a:rPr>
-                          <m:t>𝑘</m:t>
-                        </m:r>
-                      </m:sub>
-                      <m:sup>
-                        <m:r>
-                          <a:rPr lang="en-US" b="0" i="1" dirty="0" smtClean="0">
-                            <a:latin typeface="Cambria Math" panose="02040503050406030204" pitchFamily="18" charset="0"/>
-                          </a:rPr>
-                          <m:t>𝑚</m:t>
-                        </m:r>
-                      </m:sup>
-                    </m:sSubSup>
-                    <m:r>
-                      <a:rPr lang="en-US" i="1" dirty="0" smtClean="0">
-                        <a:latin typeface="Cambria Math" panose="02040503050406030204" pitchFamily="18" charset="0"/>
-                      </a:rPr>
-                      <m:t> }</m:t>
-                    </m:r>
-                  </m:oMath>
-                </a14:m>
-                <a:endParaRPr lang="en-US" b="1" dirty="0"/>
-              </a:p>
-              <a:p>
-                <a:endParaRPr lang="en-US" dirty="0"/>
-              </a:p>
-            </p:txBody>
-          </p:sp>
-        </mc:Choice>
-        <mc:Fallback xmlns="">
-          <p:sp>
-            <p:nvSpPr>
-              <p:cNvPr id="3" name="Content Placeholder 2">
-                <a:extLst>
-                  <a:ext uri="{FF2B5EF4-FFF2-40B4-BE49-F238E27FC236}">
-                    <a16:creationId xmlns:a16="http://schemas.microsoft.com/office/drawing/2014/main" id="{A1E99C37-D85E-49D9-93FB-7DBBD732EBC1}"/>
-                  </a:ext>
-                </a:extLst>
-              </p:cNvPr>
-              <p:cNvSpPr>
-                <a:spLocks noGrp="1" noRot="1" noChangeAspect="1" noMove="1" noResize="1" noEditPoints="1" noAdjustHandles="1" noChangeArrowheads="1" noChangeShapeType="1" noTextEdit="1"/>
-              </p:cNvSpPr>
-              <p:nvPr>
-                <p:ph idx="1"/>
-              </p:nvPr>
-            </p:nvSpPr>
-            <p:spPr>
-              <a:blipFill>
-                <a:blip r:embed="rId2"/>
-                <a:stretch>
-                  <a:fillRect l="-1462"/>
-                </a:stretch>
-              </a:blipFill>
-            </p:spPr>
-            <p:txBody>
-              <a:bodyPr/>
-              <a:lstStyle/>
-              <a:p>
-                <a:r>
-                  <a:rPr lang="en-US">
-                    <a:noFill/>
-                  </a:rPr>
-                  <a:t> </a:t>
-                </a:r>
-              </a:p>
-            </p:txBody>
-          </p:sp>
-        </mc:Fallback>
-      </mc:AlternateContent>
-    </p:spTree>
-    <p:extLst>
-      <p:ext uri="{BB962C8B-B14F-4D97-AF65-F5344CB8AC3E}">
-        <p14:creationId xmlns:p14="http://schemas.microsoft.com/office/powerpoint/2010/main" val="2958691046"/>
-      </p:ext>
-    </p:extLst>
-  </p:cSld>
-  <p:clrMapOvr>
-    <a:masterClrMapping/>
-  </p:clrMapOvr>
-</p:sld>
-</file>
-
-<file path=ppt/slides/slide18.xml><?xml version="1.0" encoding="utf-8"?>
-<p:sld xmlns:a="http://schemas.openxmlformats.org/drawingml/2006/main" xmlns:r="http://schemas.openxmlformats.org/officeDocument/2006/relationships" xmlns:p="http://schemas.openxmlformats.org/presentationml/2006/main">
-  <p:cSld>
-    <p:spTree>
-      <p:nvGrpSpPr>
-        <p:cNvPr id="1" name=""/>
-        <p:cNvGrpSpPr/>
-        <p:nvPr/>
-      </p:nvGrpSpPr>
-      <p:grpSpPr>
-        <a:xfrm>
-          <a:off x="0" y="0"/>
-          <a:ext cx="0" cy="0"/>
-          <a:chOff x="0" y="0"/>
-          <a:chExt cx="0" cy="0"/>
-        </a:xfrm>
-      </p:grpSpPr>
-      <p:sp>
-        <p:nvSpPr>
-          <p:cNvPr id="3" name="Title 2">
-            <a:extLst>
-              <a:ext uri="{FF2B5EF4-FFF2-40B4-BE49-F238E27FC236}">
-                <a16:creationId xmlns:a16="http://schemas.microsoft.com/office/drawing/2014/main" id="{3FFF541F-53B9-C248-9C24-3F0A14B90E4C}"/>
-              </a:ext>
-            </a:extLst>
-          </p:cNvPr>
-          <p:cNvSpPr>
-            <a:spLocks noGrp="1"/>
-          </p:cNvSpPr>
-          <p:nvPr>
-            <p:ph type="title"/>
-          </p:nvPr>
-        </p:nvSpPr>
-        <p:spPr/>
-        <p:txBody>
-          <a:bodyPr/>
-          <a:lstStyle/>
-          <a:p>
-            <a:r>
-              <a:rPr lang="en-US" dirty="0"/>
-              <a:t>Data Used for the Implementation</a:t>
-            </a:r>
-          </a:p>
-        </p:txBody>
-      </p:sp>
-      <p:pic>
-        <p:nvPicPr>
-          <p:cNvPr id="5" name="Picture 4">
-            <a:extLst>
-              <a:ext uri="{FF2B5EF4-FFF2-40B4-BE49-F238E27FC236}">
-                <a16:creationId xmlns:a16="http://schemas.microsoft.com/office/drawing/2014/main" id="{042C9515-B6D0-7640-870C-1AC70F5EDADB}"/>
-              </a:ext>
-            </a:extLst>
-          </p:cNvPr>
-          <p:cNvPicPr>
-            <a:picLocks noChangeAspect="1"/>
-          </p:cNvPicPr>
-          <p:nvPr/>
-        </p:nvPicPr>
-        <p:blipFill rotWithShape="1">
-          <a:blip r:embed="rId2">
-            <a:extLst>
-              <a:ext uri="{28A0092B-C50C-407E-A947-70E740481C1C}">
-                <a14:useLocalDpi xmlns:a14="http://schemas.microsoft.com/office/drawing/2010/main" val="0"/>
-              </a:ext>
-            </a:extLst>
-          </a:blip>
-          <a:srcRect l="605" r="1888"/>
-          <a:stretch/>
-        </p:blipFill>
-        <p:spPr>
-          <a:xfrm>
-            <a:off x="356461" y="1482456"/>
-            <a:ext cx="10941803" cy="4329408"/>
-          </a:xfrm>
-          <a:prstGeom prst="rect">
-            <a:avLst/>
-          </a:prstGeom>
-        </p:spPr>
-      </p:pic>
-      <p:sp>
-        <p:nvSpPr>
-          <p:cNvPr id="2" name="Slide Number Placeholder 1">
-            <a:extLst>
-              <a:ext uri="{FF2B5EF4-FFF2-40B4-BE49-F238E27FC236}">
-                <a16:creationId xmlns:a16="http://schemas.microsoft.com/office/drawing/2014/main" id="{65DC0333-05B0-8342-88AC-F3ED493C3574}"/>
-              </a:ext>
-            </a:extLst>
-          </p:cNvPr>
-          <p:cNvSpPr>
-            <a:spLocks noGrp="1"/>
-          </p:cNvSpPr>
-          <p:nvPr>
-            <p:ph type="sldNum" sz="quarter" idx="16"/>
-          </p:nvPr>
-        </p:nvSpPr>
-        <p:spPr/>
-        <p:txBody>
-          <a:bodyPr/>
-          <a:lstStyle/>
-          <a:p>
-            <a:fld id="{1915DC07-6425-4740-9695-FB9F2ED48CC1}" type="slidenum">
-              <a:rPr lang="en-US" smtClean="0"/>
-              <a:t>18</a:t>
-            </a:fld>
-            <a:endParaRPr lang="en-US"/>
-          </a:p>
-        </p:txBody>
-      </p:sp>
-    </p:spTree>
-    <p:extLst>
-      <p:ext uri="{BB962C8B-B14F-4D97-AF65-F5344CB8AC3E}">
-        <p14:creationId xmlns:p14="http://schemas.microsoft.com/office/powerpoint/2010/main" val="3494120698"/>
-      </p:ext>
-    </p:extLst>
-  </p:cSld>
-  <p:clrMapOvr>
-    <a:masterClrMapping/>
-  </p:clrMapOvr>
-  <p:transition>
-    <p:fade/>
-  </p:transition>
-</p:sld>
-</file>
-
-<file path=ppt/slides/slide19.xml><?xml version="1.0" encoding="utf-8"?>
-<p:sld xmlns:a="http://schemas.openxmlformats.org/drawingml/2006/main" xmlns:r="http://schemas.openxmlformats.org/officeDocument/2006/relationships" xmlns:p="http://schemas.openxmlformats.org/presentationml/2006/main">
-  <p:cSld>
-    <p:spTree>
-      <p:nvGrpSpPr>
-        <p:cNvPr id="1" name=""/>
-        <p:cNvGrpSpPr/>
-        <p:nvPr/>
-      </p:nvGrpSpPr>
-      <p:grpSpPr>
-        <a:xfrm>
-          <a:off x="0" y="0"/>
-          <a:ext cx="0" cy="0"/>
-          <a:chOff x="0" y="0"/>
-          <a:chExt cx="0" cy="0"/>
-        </a:xfrm>
-      </p:grpSpPr>
-      <p:sp>
-        <p:nvSpPr>
-          <p:cNvPr id="2" name="Title 1">
-            <a:extLst>
-              <a:ext uri="{FF2B5EF4-FFF2-40B4-BE49-F238E27FC236}">
-                <a16:creationId xmlns:a16="http://schemas.microsoft.com/office/drawing/2014/main" id="{6B88366F-5D7F-42DD-8FE7-DFFD79E1E337}"/>
-              </a:ext>
-            </a:extLst>
-          </p:cNvPr>
-          <p:cNvSpPr>
-            <a:spLocks noGrp="1"/>
-          </p:cNvSpPr>
-          <p:nvPr>
-            <p:ph type="title"/>
-          </p:nvPr>
-        </p:nvSpPr>
-        <p:spPr/>
-        <p:txBody>
-          <a:bodyPr/>
-          <a:lstStyle/>
-          <a:p>
-            <a:r>
-              <a:rPr lang="en-US" dirty="0"/>
-              <a:t>Deliverables</a:t>
-            </a:r>
-          </a:p>
-        </p:txBody>
-      </p:sp>
-      <mc:AlternateContent xmlns:mc="http://schemas.openxmlformats.org/markup-compatibility/2006" xmlns:a14="http://schemas.microsoft.com/office/drawing/2010/main">
-        <mc:Choice Requires="a14">
-          <p:sp>
-            <p:nvSpPr>
-              <p:cNvPr id="3" name="Content Placeholder 2">
-                <a:extLst>
-                  <a:ext uri="{FF2B5EF4-FFF2-40B4-BE49-F238E27FC236}">
-                    <a16:creationId xmlns:a16="http://schemas.microsoft.com/office/drawing/2014/main" id="{F8401C7B-BE7A-4239-9CED-19B9B040C15D}"/>
-                  </a:ext>
-                </a:extLst>
-              </p:cNvPr>
-              <p:cNvSpPr>
-                <a:spLocks noGrp="1"/>
-              </p:cNvSpPr>
-              <p:nvPr>
-                <p:ph idx="1"/>
-              </p:nvPr>
-            </p:nvSpPr>
-            <p:spPr/>
-            <p:txBody>
-              <a:bodyPr/>
-              <a:lstStyle/>
-              <a:p>
-                <a:pPr marL="342900" indent="-342900">
-                  <a:lnSpc>
-                    <a:spcPct val="200000"/>
-                  </a:lnSpc>
-                  <a:buFont typeface="Arial" panose="020B0604020202020204" pitchFamily="34" charset="0"/>
-                  <a:buChar char="•"/>
-                </a:pPr>
-                <a:r>
-                  <a:rPr lang="en-US" dirty="0"/>
-                  <a:t>Learn a model for the system dynamics (only function </a:t>
-                </a:r>
-                <a14:m>
-                  <m:oMath xmlns:m="http://schemas.openxmlformats.org/officeDocument/2006/math">
-                    <m:sSub>
-                      <m:sSubPr>
-                        <m:ctrlPr>
-                          <a:rPr lang="en-US" b="1" i="1" dirty="0" smtClean="0">
-                            <a:latin typeface="Cambria Math" panose="02040503050406030204" pitchFamily="18" charset="0"/>
-                          </a:rPr>
-                        </m:ctrlPr>
-                      </m:sSubPr>
-                      <m:e>
-                        <m:r>
-                          <a:rPr lang="en-US" b="1" i="1" dirty="0" smtClean="0">
-                            <a:latin typeface="Cambria Math" panose="02040503050406030204" pitchFamily="18" charset="0"/>
-                          </a:rPr>
-                          <m:t>𝒈</m:t>
-                        </m:r>
-                      </m:e>
-                      <m:sub>
-                        <m:r>
-                          <a:rPr lang="en-US" b="1" i="1" dirty="0" smtClean="0">
-                            <a:latin typeface="Cambria Math" panose="02040503050406030204" pitchFamily="18" charset="0"/>
-                          </a:rPr>
-                          <m:t>𝜽</m:t>
-                        </m:r>
-                      </m:sub>
-                    </m:sSub>
-                  </m:oMath>
-                </a14:m>
-                <a:r>
-                  <a:rPr lang="en-US" dirty="0"/>
-                  <a:t>) that is a good approximation</a:t>
-                </a:r>
-              </a:p>
-              <a:p>
-                <a:pPr marL="342900" indent="-342900">
-                  <a:lnSpc>
-                    <a:spcPct val="200000"/>
-                  </a:lnSpc>
-                  <a:buFont typeface="Arial" panose="020B0604020202020204" pitchFamily="34" charset="0"/>
-                  <a:buChar char="•"/>
-                </a:pPr>
-                <a:r>
-                  <a:rPr lang="en-US" dirty="0"/>
-                  <a:t>Build a control law (function </a:t>
-                </a:r>
-                <a:r>
-                  <a:rPr lang="en-US" b="1" i="1" dirty="0"/>
-                  <a:t>h</a:t>
-                </a:r>
-                <a:r>
-                  <a:rPr lang="en-US" dirty="0"/>
-                  <a:t>) that minimizes cumulative utility drop</a:t>
-                </a:r>
-              </a:p>
-              <a:p>
-                <a:pPr marL="342900" indent="-342900">
-                  <a:lnSpc>
-                    <a:spcPct val="200000"/>
-                  </a:lnSpc>
-                  <a:buFont typeface="Arial" panose="020B0604020202020204" pitchFamily="34" charset="0"/>
-                  <a:buChar char="•"/>
-                </a:pPr>
-                <a:r>
-                  <a:rPr lang="en-US" dirty="0"/>
-                  <a:t>Evaluate of these models under various situations (sensitivity analysis)</a:t>
-                </a:r>
-              </a:p>
-              <a:p>
-                <a:endParaRPr lang="en-US" dirty="0"/>
-              </a:p>
-            </p:txBody>
-          </p:sp>
-        </mc:Choice>
-        <mc:Fallback xmlns="">
-          <p:sp>
-            <p:nvSpPr>
-              <p:cNvPr id="3" name="Content Placeholder 2">
-                <a:extLst>
-                  <a:ext uri="{FF2B5EF4-FFF2-40B4-BE49-F238E27FC236}">
-                    <a16:creationId xmlns:a16="http://schemas.microsoft.com/office/drawing/2014/main" id="{F8401C7B-BE7A-4239-9CED-19B9B040C15D}"/>
-                  </a:ext>
-                </a:extLst>
-              </p:cNvPr>
-              <p:cNvSpPr>
-                <a:spLocks noGrp="1" noRot="1" noChangeAspect="1" noMove="1" noResize="1" noEditPoints="1" noAdjustHandles="1" noChangeArrowheads="1" noChangeShapeType="1" noTextEdit="1"/>
-              </p:cNvSpPr>
-              <p:nvPr>
-                <p:ph idx="1"/>
-              </p:nvPr>
-            </p:nvSpPr>
-            <p:spPr>
-              <a:blipFill>
-                <a:blip r:embed="rId2"/>
-                <a:stretch>
-                  <a:fillRect l="-1462" r="-864"/>
-                </a:stretch>
-              </a:blipFill>
-            </p:spPr>
-            <p:txBody>
-              <a:bodyPr/>
-              <a:lstStyle/>
-              <a:p>
-                <a:r>
-                  <a:rPr lang="en-US">
-                    <a:noFill/>
-                  </a:rPr>
-                  <a:t> </a:t>
-                </a:r>
-              </a:p>
-            </p:txBody>
-          </p:sp>
-        </mc:Fallback>
-      </mc:AlternateContent>
-    </p:spTree>
-    <p:extLst>
-      <p:ext uri="{BB962C8B-B14F-4D97-AF65-F5344CB8AC3E}">
-        <p14:creationId xmlns:p14="http://schemas.microsoft.com/office/powerpoint/2010/main" val="2013028125"/>
-      </p:ext>
-    </p:extLst>
-  </p:cSld>
-  <p:clrMapOvr>
-    <a:masterClrMapping/>
-  </p:clrMapOvr>
 </p:sld>
 </file>
 
@@ -18809,596 +17698,6 @@
   <p:clrMapOvr>
     <a:masterClrMapping/>
   </p:clrMapOvr>
-</p:sld>
-</file>
-
-<file path=ppt/slides/slide20.xml><?xml version="1.0" encoding="utf-8"?>
-<p:sld xmlns:a="http://schemas.openxmlformats.org/drawingml/2006/main" xmlns:r="http://schemas.openxmlformats.org/officeDocument/2006/relationships" xmlns:p="http://schemas.openxmlformats.org/presentationml/2006/main">
-  <p:cSld>
-    <p:spTree>
-      <p:nvGrpSpPr>
-        <p:cNvPr id="1" name=""/>
-        <p:cNvGrpSpPr/>
-        <p:nvPr/>
-      </p:nvGrpSpPr>
-      <p:grpSpPr>
-        <a:xfrm>
-          <a:off x="0" y="0"/>
-          <a:ext cx="0" cy="0"/>
-          <a:chOff x="0" y="0"/>
-          <a:chExt cx="0" cy="0"/>
-        </a:xfrm>
-      </p:grpSpPr>
-      <p:sp>
-        <p:nvSpPr>
-          <p:cNvPr id="2" name="Title 1">
-            <a:extLst>
-              <a:ext uri="{FF2B5EF4-FFF2-40B4-BE49-F238E27FC236}">
-                <a16:creationId xmlns:a16="http://schemas.microsoft.com/office/drawing/2014/main" id="{66C172B5-83DC-4A89-878F-CD6D75345A4B}"/>
-              </a:ext>
-            </a:extLst>
-          </p:cNvPr>
-          <p:cNvSpPr>
-            <a:spLocks noGrp="1"/>
-          </p:cNvSpPr>
-          <p:nvPr>
-            <p:ph type="title"/>
-          </p:nvPr>
-        </p:nvSpPr>
-        <p:spPr/>
-        <p:txBody>
-          <a:bodyPr/>
-          <a:lstStyle/>
-          <a:p>
-            <a:r>
-              <a:rPr lang="en-US" dirty="0"/>
-              <a:t>Project-1 - Tasks </a:t>
-            </a:r>
-          </a:p>
-        </p:txBody>
-      </p:sp>
-      <p:sp>
-        <p:nvSpPr>
-          <p:cNvPr id="3" name="Content Placeholder 2">
-            <a:extLst>
-              <a:ext uri="{FF2B5EF4-FFF2-40B4-BE49-F238E27FC236}">
-                <a16:creationId xmlns:a16="http://schemas.microsoft.com/office/drawing/2014/main" id="{1DE974AB-B568-43BE-BD8A-5B04EA680608}"/>
-              </a:ext>
-            </a:extLst>
-          </p:cNvPr>
-          <p:cNvSpPr>
-            <a:spLocks noGrp="1"/>
-          </p:cNvSpPr>
-          <p:nvPr>
-            <p:ph idx="1"/>
-          </p:nvPr>
-        </p:nvSpPr>
-        <p:spPr>
-          <a:xfrm>
-            <a:off x="478369" y="1524000"/>
-            <a:ext cx="9169401" cy="5334000"/>
-          </a:xfrm>
-        </p:spPr>
-        <p:txBody>
-          <a:bodyPr/>
-          <a:lstStyle/>
-          <a:p>
-            <a:pPr marL="457200" indent="-457200">
-              <a:buAutoNum type="arabicPeriod"/>
-            </a:pPr>
-            <a:r>
-              <a:rPr lang="en-US" sz="1800" dirty="0"/>
-              <a:t>Environment Setup</a:t>
-            </a:r>
-          </a:p>
-          <a:p>
-            <a:pPr marL="814908" lvl="1" indent="-457200">
-              <a:buAutoNum type="arabicPeriod"/>
-            </a:pPr>
-            <a:r>
-              <a:rPr lang="en-US" sz="1800" dirty="0"/>
-              <a:t>Execute </a:t>
-            </a:r>
-            <a:r>
-              <a:rPr lang="en-US" sz="1800" dirty="0" err="1"/>
-              <a:t>mRubis</a:t>
-            </a:r>
-            <a:r>
-              <a:rPr lang="en-US" sz="1800" dirty="0"/>
-              <a:t> system simulator Java-Java</a:t>
-            </a:r>
-          </a:p>
-          <a:p>
-            <a:pPr marL="814908" lvl="1" indent="-457200">
-              <a:buAutoNum type="arabicPeriod"/>
-            </a:pPr>
-            <a:r>
-              <a:rPr lang="en-US" sz="1800" dirty="0"/>
-              <a:t>Execute the integration Python-Java</a:t>
-            </a:r>
-          </a:p>
-          <a:p>
-            <a:pPr marL="457200" indent="-457200">
-              <a:buAutoNum type="arabicPeriod"/>
-            </a:pPr>
-            <a:r>
-              <a:rPr lang="en-US" sz="1800" dirty="0"/>
-              <a:t>System Identification (train a model of </a:t>
-            </a:r>
-            <a:r>
-              <a:rPr lang="en-US" sz="1800" dirty="0" err="1"/>
-              <a:t>mRubis</a:t>
-            </a:r>
-            <a:r>
-              <a:rPr lang="en-US" sz="1800" dirty="0"/>
-              <a:t> system)</a:t>
-            </a:r>
-          </a:p>
-          <a:p>
-            <a:pPr marL="814908" lvl="1" indent="-457200">
-              <a:buAutoNum type="arabicPeriod"/>
-            </a:pPr>
-            <a:r>
-              <a:rPr lang="en-US" sz="1800" dirty="0"/>
-              <a:t>Choose a Machine Learning algorithm)</a:t>
-            </a:r>
-          </a:p>
-          <a:p>
-            <a:pPr marL="814908" lvl="1" indent="-457200">
-              <a:buAutoNum type="arabicPeriod"/>
-            </a:pPr>
-            <a:r>
-              <a:rPr lang="en-US" sz="1800" dirty="0"/>
-              <a:t>Train a prior model with batch data</a:t>
-            </a:r>
-          </a:p>
-          <a:p>
-            <a:pPr marL="457200" indent="-457200">
-              <a:buAutoNum type="arabicPeriod"/>
-            </a:pPr>
-            <a:r>
-              <a:rPr lang="en-US" sz="1800" dirty="0"/>
-              <a:t>Controller Synthesis</a:t>
-            </a:r>
-          </a:p>
-          <a:p>
-            <a:pPr marL="814908" lvl="1" indent="-457200">
-              <a:buAutoNum type="arabicPeriod"/>
-            </a:pPr>
-            <a:r>
-              <a:rPr lang="en-US" sz="1800" dirty="0"/>
-              <a:t>Sample the sensors</a:t>
-            </a:r>
-          </a:p>
-          <a:p>
-            <a:pPr marL="814908" lvl="1" indent="-457200">
-              <a:buAutoNum type="arabicPeriod"/>
-            </a:pPr>
-            <a:r>
-              <a:rPr lang="en-US" sz="1800" dirty="0"/>
-              <a:t>Learn the control model/law </a:t>
-            </a:r>
-          </a:p>
-          <a:p>
-            <a:pPr marL="1172615" lvl="2" indent="-457200">
-              <a:buAutoNum type="arabicPeriod"/>
-            </a:pPr>
-            <a:r>
-              <a:rPr lang="en-US" sz="1800" dirty="0"/>
-              <a:t>choose which actuators to execute and in which order</a:t>
-            </a:r>
-          </a:p>
-          <a:p>
-            <a:pPr marL="457200" indent="-457200">
-              <a:buAutoNum type="arabicPeriod"/>
-            </a:pPr>
-            <a:r>
-              <a:rPr lang="en-US" sz="1800" dirty="0"/>
-              <a:t>Evaluation</a:t>
-            </a:r>
-          </a:p>
-          <a:p>
-            <a:pPr marL="1172615" lvl="2" indent="-457200">
-              <a:buAutoNum type="arabicPeriod"/>
-            </a:pPr>
-            <a:r>
-              <a:rPr lang="en-US" sz="1800" dirty="0"/>
-              <a:t>Level of disturbances</a:t>
-            </a:r>
-          </a:p>
-          <a:p>
-            <a:pPr marL="1172615" lvl="2" indent="-457200">
-              <a:buAutoNum type="arabicPeriod"/>
-            </a:pPr>
-            <a:r>
-              <a:rPr lang="en-US" sz="1800" dirty="0"/>
-              <a:t>Sensor sampling frequency</a:t>
-            </a:r>
-          </a:p>
-          <a:p>
-            <a:pPr marL="1172615" lvl="2" indent="-457200">
-              <a:buAutoNum type="arabicPeriod"/>
-            </a:pPr>
-            <a:r>
-              <a:rPr lang="en-US" sz="1800" dirty="0"/>
-              <a:t>Actuation frequency</a:t>
-            </a:r>
-          </a:p>
-        </p:txBody>
-      </p:sp>
-      <p:sp>
-        <p:nvSpPr>
-          <p:cNvPr id="4" name="TextBox 3">
-            <a:extLst>
-              <a:ext uri="{FF2B5EF4-FFF2-40B4-BE49-F238E27FC236}">
-                <a16:creationId xmlns:a16="http://schemas.microsoft.com/office/drawing/2014/main" id="{49F142DC-7816-4841-A0C0-A284530774AD}"/>
-              </a:ext>
-            </a:extLst>
-          </p:cNvPr>
-          <p:cNvSpPr txBox="1"/>
-          <p:nvPr/>
-        </p:nvSpPr>
-        <p:spPr bwMode="gray">
-          <a:xfrm>
-            <a:off x="8575964" y="2050117"/>
-            <a:ext cx="3342497" cy="3803606"/>
-          </a:xfrm>
-          <a:prstGeom prst="rect">
-            <a:avLst/>
-          </a:prstGeom>
-          <a:solidFill>
-            <a:schemeClr val="accent3">
-              <a:lumMod val="20000"/>
-              <a:lumOff val="80000"/>
-            </a:schemeClr>
-          </a:solidFill>
-        </p:spPr>
-        <p:txBody>
-          <a:bodyPr wrap="square" lIns="91440" tIns="91440" rIns="91440" bIns="91440" rtlCol="0">
-            <a:noAutofit/>
-          </a:bodyPr>
-          <a:lstStyle/>
-          <a:p>
-            <a:pPr>
-              <a:spcBef>
-                <a:spcPts val="300"/>
-              </a:spcBef>
-              <a:spcAft>
-                <a:spcPts val="300"/>
-              </a:spcAft>
-              <a:buClr>
-                <a:schemeClr val="accent1"/>
-              </a:buClr>
-              <a:buSzPct val="90000"/>
-            </a:pPr>
-            <a:r>
-              <a:rPr lang="en-US" sz="1400" b="1" dirty="0"/>
-              <a:t>Rationale of the Plan</a:t>
-            </a:r>
-          </a:p>
-          <a:p>
-            <a:pPr marL="182563" indent="-182563">
-              <a:spcBef>
-                <a:spcPts val="300"/>
-              </a:spcBef>
-              <a:spcAft>
-                <a:spcPts val="300"/>
-              </a:spcAft>
-              <a:buClr>
-                <a:schemeClr val="accent1"/>
-              </a:buClr>
-              <a:buSzPct val="90000"/>
-              <a:buFont typeface="Arial" panose="020B0604020202020204" pitchFamily="34" charset="0"/>
-              <a:buChar char="■"/>
-            </a:pPr>
-            <a:r>
-              <a:rPr lang="en-US" sz="1400" dirty="0"/>
-              <a:t>Tasks 2 and 3 will rotate among you three across the projects, so everyone can work more deeply on System Identification and </a:t>
-            </a:r>
-            <a:r>
-              <a:rPr lang="en-US" sz="1400"/>
-              <a:t>Controller Synthesis</a:t>
-            </a:r>
-          </a:p>
-          <a:p>
-            <a:pPr marL="182563" indent="-182563">
-              <a:spcBef>
-                <a:spcPts val="300"/>
-              </a:spcBef>
-              <a:spcAft>
-                <a:spcPts val="300"/>
-              </a:spcAft>
-              <a:buClr>
-                <a:schemeClr val="accent1"/>
-              </a:buClr>
-              <a:buSzPct val="90000"/>
-              <a:buFont typeface="Arial" panose="020B0604020202020204" pitchFamily="34" charset="0"/>
-              <a:buChar char="■"/>
-            </a:pPr>
-            <a:endParaRPr lang="en-US" sz="1400" dirty="0"/>
-          </a:p>
-          <a:p>
-            <a:pPr marL="182563" indent="-182563">
-              <a:spcBef>
-                <a:spcPts val="300"/>
-              </a:spcBef>
-              <a:spcAft>
-                <a:spcPts val="300"/>
-              </a:spcAft>
-              <a:buClr>
-                <a:schemeClr val="accent1"/>
-              </a:buClr>
-              <a:buSzPct val="90000"/>
-              <a:buFont typeface="Arial" panose="020B0604020202020204" pitchFamily="34" charset="0"/>
-              <a:buChar char="■"/>
-            </a:pPr>
-            <a:r>
-              <a:rPr lang="en-US" sz="1400" dirty="0"/>
-              <a:t>However, everyone will run a separate evaluation and present their findings. This way, all of you have a chance to reflect upon the methods and architecture</a:t>
-            </a:r>
-          </a:p>
-        </p:txBody>
-      </p:sp>
-    </p:spTree>
-    <p:extLst>
-      <p:ext uri="{BB962C8B-B14F-4D97-AF65-F5344CB8AC3E}">
-        <p14:creationId xmlns:p14="http://schemas.microsoft.com/office/powerpoint/2010/main" val="1031803684"/>
-      </p:ext>
-    </p:extLst>
-  </p:cSld>
-  <p:clrMapOvr>
-    <a:masterClrMapping/>
-  </p:clrMapOvr>
-</p:sld>
-</file>
-
-<file path=ppt/slides/slide21.xml><?xml version="1.0" encoding="utf-8"?>
-<p:sld xmlns:a="http://schemas.openxmlformats.org/drawingml/2006/main" xmlns:r="http://schemas.openxmlformats.org/officeDocument/2006/relationships" xmlns:p="http://schemas.openxmlformats.org/presentationml/2006/main">
-  <p:cSld>
-    <p:spTree>
-      <p:nvGrpSpPr>
-        <p:cNvPr id="1" name=""/>
-        <p:cNvGrpSpPr/>
-        <p:nvPr/>
-      </p:nvGrpSpPr>
-      <p:grpSpPr>
-        <a:xfrm>
-          <a:off x="0" y="0"/>
-          <a:ext cx="0" cy="0"/>
-          <a:chOff x="0" y="0"/>
-          <a:chExt cx="0" cy="0"/>
-        </a:xfrm>
-      </p:grpSpPr>
-      <p:sp>
-        <p:nvSpPr>
-          <p:cNvPr id="2" name="Title 1">
-            <a:extLst>
-              <a:ext uri="{FF2B5EF4-FFF2-40B4-BE49-F238E27FC236}">
-                <a16:creationId xmlns:a16="http://schemas.microsoft.com/office/drawing/2014/main" id="{A91B3B84-F6BE-49DF-B7EA-803BE22E2CBF}"/>
-              </a:ext>
-            </a:extLst>
-          </p:cNvPr>
-          <p:cNvSpPr>
-            <a:spLocks noGrp="1"/>
-          </p:cNvSpPr>
-          <p:nvPr>
-            <p:ph type="title"/>
-          </p:nvPr>
-        </p:nvSpPr>
-        <p:spPr/>
-        <p:txBody>
-          <a:bodyPr/>
-          <a:lstStyle/>
-          <a:p>
-            <a:r>
-              <a:rPr lang="en-US" dirty="0"/>
-              <a:t>Roadmap</a:t>
-            </a:r>
-          </a:p>
-        </p:txBody>
-      </p:sp>
-      <p:sp>
-        <p:nvSpPr>
-          <p:cNvPr id="3" name="Content Placeholder 2">
-            <a:extLst>
-              <a:ext uri="{FF2B5EF4-FFF2-40B4-BE49-F238E27FC236}">
-                <a16:creationId xmlns:a16="http://schemas.microsoft.com/office/drawing/2014/main" id="{5F8DAD49-FCC5-454C-9F7A-EC38082639E3}"/>
-              </a:ext>
-            </a:extLst>
-          </p:cNvPr>
-          <p:cNvSpPr>
-            <a:spLocks noGrp="1"/>
-          </p:cNvSpPr>
-          <p:nvPr>
-            <p:ph idx="1"/>
-          </p:nvPr>
-        </p:nvSpPr>
-        <p:spPr>
-          <a:xfrm>
-            <a:off x="487815" y="1692193"/>
-            <a:ext cx="9169401" cy="4751917"/>
-          </a:xfrm>
-        </p:spPr>
-        <p:txBody>
-          <a:bodyPr/>
-          <a:lstStyle/>
-          <a:p>
-            <a:r>
-              <a:rPr lang="en-US" dirty="0"/>
-              <a:t>Project-1</a:t>
-            </a:r>
-          </a:p>
-          <a:p>
-            <a:pPr marL="342900" indent="-342900">
-              <a:buFont typeface="Arial" panose="020B0604020202020204" pitchFamily="34" charset="0"/>
-              <a:buChar char="•"/>
-            </a:pPr>
-            <a:r>
-              <a:rPr lang="en-US" dirty="0"/>
-              <a:t>Full-State Measurements</a:t>
-            </a:r>
-          </a:p>
-          <a:p>
-            <a:pPr marL="342900" indent="-342900">
-              <a:buFont typeface="Arial" panose="020B0604020202020204" pitchFamily="34" charset="0"/>
-              <a:buChar char="•"/>
-            </a:pPr>
-            <a:r>
-              <a:rPr lang="en-US" dirty="0"/>
-              <a:t>Linear and Non-Linear System Dynamics</a:t>
-            </a:r>
-          </a:p>
-          <a:p>
-            <a:r>
-              <a:rPr lang="en-US" dirty="0"/>
-              <a:t>Project-2</a:t>
-            </a:r>
-          </a:p>
-          <a:p>
-            <a:pPr marL="342900" indent="-342900">
-              <a:buFont typeface="Arial" panose="020B0604020202020204" pitchFamily="34" charset="0"/>
-              <a:buChar char="•"/>
-            </a:pPr>
-            <a:r>
-              <a:rPr lang="en-US" dirty="0"/>
-              <a:t>Partial State Measurements</a:t>
-            </a:r>
-          </a:p>
-          <a:p>
-            <a:pPr marL="342900" indent="-342900">
-              <a:buFont typeface="Arial" panose="020B0604020202020204" pitchFamily="34" charset="0"/>
-              <a:buChar char="•"/>
-            </a:pPr>
-            <a:r>
-              <a:rPr lang="en-US" dirty="0"/>
-              <a:t>Latent Models (Failure Masking)</a:t>
-            </a:r>
-          </a:p>
-          <a:p>
-            <a:r>
-              <a:rPr lang="en-US" dirty="0"/>
-              <a:t>Project-3</a:t>
-            </a:r>
-          </a:p>
-          <a:p>
-            <a:pPr marL="342900" indent="-342900">
-              <a:buFont typeface="Arial" panose="020B0604020202020204" pitchFamily="34" charset="0"/>
-              <a:buChar char="•"/>
-            </a:pPr>
-            <a:r>
-              <a:rPr lang="en-US" dirty="0"/>
-              <a:t>Transfer-Learning of System Dynamics </a:t>
-            </a:r>
-          </a:p>
-          <a:p>
-            <a:pPr marL="342900" indent="-342900">
-              <a:buFont typeface="Arial" panose="020B0604020202020204" pitchFamily="34" charset="0"/>
-              <a:buChar char="•"/>
-            </a:pPr>
-            <a:r>
-              <a:rPr lang="en-US" dirty="0"/>
-              <a:t>Adaptive Control</a:t>
-            </a:r>
-          </a:p>
-          <a:p>
-            <a:r>
-              <a:rPr lang="en-US" dirty="0"/>
-              <a:t>Project-4</a:t>
-            </a:r>
-          </a:p>
-          <a:p>
-            <a:pPr marL="342900" indent="-342900">
-              <a:buFont typeface="Arial" panose="020B0604020202020204" pitchFamily="34" charset="0"/>
-              <a:buChar char="•"/>
-            </a:pPr>
-            <a:r>
-              <a:rPr lang="en-US" dirty="0"/>
-              <a:t>Reinforcement Learning Control</a:t>
-            </a:r>
-          </a:p>
-          <a:p>
-            <a:pPr marL="342900" indent="-342900">
-              <a:buFont typeface="Arial" panose="020B0604020202020204" pitchFamily="34" charset="0"/>
-              <a:buChar char="•"/>
-            </a:pPr>
-            <a:r>
-              <a:rPr lang="en-US" dirty="0"/>
-              <a:t>Model-Based, Model-Free versus ML-Control</a:t>
-            </a:r>
-          </a:p>
-        </p:txBody>
-      </p:sp>
-    </p:spTree>
-    <p:extLst>
-      <p:ext uri="{BB962C8B-B14F-4D97-AF65-F5344CB8AC3E}">
-        <p14:creationId xmlns:p14="http://schemas.microsoft.com/office/powerpoint/2010/main" val="1207590876"/>
-      </p:ext>
-    </p:extLst>
-  </p:cSld>
-  <p:clrMapOvr>
-    <a:masterClrMapping/>
-  </p:clrMapOvr>
-</p:sld>
-</file>
-
-<file path=ppt/slides/slide22.xml><?xml version="1.0" encoding="utf-8"?>
-<p:sld xmlns:a="http://schemas.openxmlformats.org/drawingml/2006/main" xmlns:r="http://schemas.openxmlformats.org/officeDocument/2006/relationships" xmlns:p="http://schemas.openxmlformats.org/presentationml/2006/main">
-  <p:cSld>
-    <p:spTree>
-      <p:nvGrpSpPr>
-        <p:cNvPr id="1" name=""/>
-        <p:cNvGrpSpPr/>
-        <p:nvPr/>
-      </p:nvGrpSpPr>
-      <p:grpSpPr>
-        <a:xfrm>
-          <a:off x="0" y="0"/>
-          <a:ext cx="0" cy="0"/>
-          <a:chOff x="0" y="0"/>
-          <a:chExt cx="0" cy="0"/>
-        </a:xfrm>
-      </p:grpSpPr>
-      <p:sp>
-        <p:nvSpPr>
-          <p:cNvPr id="4" name="Title 3">
-            <a:extLst>
-              <a:ext uri="{FF2B5EF4-FFF2-40B4-BE49-F238E27FC236}">
-                <a16:creationId xmlns:a16="http://schemas.microsoft.com/office/drawing/2014/main" id="{1A849F6C-873A-4382-88A3-C443B0AD2834}"/>
-              </a:ext>
-            </a:extLst>
-          </p:cNvPr>
-          <p:cNvSpPr>
-            <a:spLocks noGrp="1"/>
-          </p:cNvSpPr>
-          <p:nvPr>
-            <p:ph type="ctrTitle"/>
-          </p:nvPr>
-        </p:nvSpPr>
-        <p:spPr/>
-        <p:txBody>
-          <a:bodyPr/>
-          <a:lstStyle/>
-          <a:p>
-            <a:r>
-              <a:rPr lang="en-US" dirty="0"/>
-              <a:t>End</a:t>
-            </a:r>
-          </a:p>
-        </p:txBody>
-      </p:sp>
-    </p:spTree>
-    <p:extLst>
-      <p:ext uri="{BB962C8B-B14F-4D97-AF65-F5344CB8AC3E}">
-        <p14:creationId xmlns:p14="http://schemas.microsoft.com/office/powerpoint/2010/main" val="2355286508"/>
-      </p:ext>
-    </p:extLst>
-  </p:cSld>
-  <p:clrMapOvr>
-    <a:masterClrMapping/>
-  </p:clrMapOvr>
-  <p:transition spd="slow">
-    <p:wipe dir="d"/>
-  </p:transition>
 </p:sld>
 </file>
 
@@ -23670,8 +21969,8 @@
           </p:sp>
         </mc:Fallback>
       </mc:AlternateContent>
-      <mc:AlternateContent xmlns:mc="http://schemas.openxmlformats.org/markup-compatibility/2006">
-        <mc:Choice xmlns:a14="http://schemas.microsoft.com/office/drawing/2010/main" Requires="a14">
+      <mc:AlternateContent xmlns:mc="http://schemas.openxmlformats.org/markup-compatibility/2006" xmlns:a14="http://schemas.microsoft.com/office/drawing/2010/main">
+        <mc:Choice Requires="a14">
           <p:sp>
             <p:nvSpPr>
               <p:cNvPr id="3" name="Content Placeholder 2">
@@ -24690,13 +22989,7 @@
                               <a:rPr lang="en-US" sz="2800" b="0" i="1" dirty="0" smtClean="0">
                                 <a:latin typeface="Cambria Math" panose="02040503050406030204" pitchFamily="18" charset="0"/>
                               </a:rPr>
-                              <m:t>𝐶</m:t>
-                            </m:r>
-                            <m:r>
-                              <a:rPr lang="en-US" sz="2800" b="0" i="1" dirty="0" smtClean="0">
-                                <a:latin typeface="Cambria Math" panose="02040503050406030204" pitchFamily="18" charset="0"/>
-                              </a:rPr>
-                              <m:t>𝐹</m:t>
+                              <m:t>𝐶𝐹</m:t>
                             </m:r>
                           </m:e>
                           <m:sub>
@@ -24723,7 +23016,7 @@
             </p:txBody>
           </p:sp>
         </mc:Choice>
-        <mc:Fallback>
+        <mc:Fallback xmlns="">
           <p:sp>
             <p:nvSpPr>
               <p:cNvPr id="3" name="Content Placeholder 2">

</xml_diff>